<commit_message>
Update Golang Warsaw #53 deck
</commit_message>
<xml_diff>
--- a/2023/2023_53_Meetup_Warsaw/intro/golang-warsaw-53.pptx
+++ b/2023/2023_53_Meetup_Warsaw/intro/golang-warsaw-53.pptx
@@ -9977,7 +9977,7 @@
           </a:bodyPr>
           <a:lstStyle/>
           <a:p>
-            <a:pPr indent="-381000" lvl="0" marL="457200" rtl="0" algn="l">
+            <a:pPr indent="0" lvl="0" marL="0" rtl="0" algn="l">
               <a:lnSpc>
                 <a:spcPct val="150000"/>
               </a:lnSpc>
@@ -9987,9 +9987,7 @@
               <a:spcAft>
                 <a:spcPts val="0"/>
               </a:spcAft>
-              <a:buSzPts val="2400"/>
-              <a:buFont typeface="Open Sans"/>
-              <a:buAutoNum type="arabicPeriod"/>
+              <a:buNone/>
             </a:pPr>
             <a:r>
               <a:rPr lang="en-GB" sz="2400">
@@ -9998,7 +9996,64 @@
                 <a:cs typeface="Open Sans"/>
                 <a:sym typeface="Open Sans"/>
               </a:rPr>
-              <a:t>Transitioning to Go - Robert Pajak</a:t>
+              <a:t>Email: </a:t>
+            </a:r>
+            <a:r>
+              <a:rPr lang="en-GB" sz="2400" u="sng">
+                <a:solidFill>
+                  <a:schemeClr val="hlink"/>
+                </a:solidFill>
+                <a:latin typeface="Open Sans"/>
+                <a:ea typeface="Open Sans"/>
+                <a:cs typeface="Open Sans"/>
+                <a:sym typeface="Open Sans"/>
+                <a:hlinkClick r:id="rId3"/>
+              </a:rPr>
+              <a:t>lukasz@lukaszgut.com</a:t>
+            </a:r>
+            <a:r>
+              <a:rPr lang="en-GB" sz="2400">
+                <a:latin typeface="Open Sans"/>
+                <a:ea typeface="Open Sans"/>
+                <a:cs typeface="Open Sans"/>
+                <a:sym typeface="Open Sans"/>
+              </a:rPr>
+              <a:t>, </a:t>
+            </a:r>
+            <a:r>
+              <a:rPr lang="en-GB" sz="2400" u="sng">
+                <a:solidFill>
+                  <a:schemeClr val="hlink"/>
+                </a:solidFill>
+                <a:latin typeface="Open Sans"/>
+                <a:ea typeface="Open Sans"/>
+                <a:cs typeface="Open Sans"/>
+                <a:sym typeface="Open Sans"/>
+                <a:hlinkClick r:id="rId4"/>
+              </a:rPr>
+              <a:t>jakubdal@gmail.com</a:t>
+            </a:r>
+            <a:r>
+              <a:rPr lang="en-GB" sz="2400">
+                <a:latin typeface="Open Sans"/>
+                <a:ea typeface="Open Sans"/>
+                <a:cs typeface="Open Sans"/>
+                <a:sym typeface="Open Sans"/>
+              </a:rPr>
+              <a:t>, </a:t>
+            </a:r>
+            <a:r>
+              <a:rPr lang="en-GB" sz="2400" u="sng">
+                <a:solidFill>
+                  <a:schemeClr val="hlink"/>
+                </a:solidFill>
+                <a:latin typeface="Open Sans"/>
+                <a:ea typeface="Open Sans"/>
+                <a:cs typeface="Open Sans"/>
+                <a:sym typeface="Open Sans"/>
+                <a:hlinkClick r:id="rId5"/>
+              </a:rPr>
+              <a:t>wbarczynski@gmail.com</a:t>
             </a:r>
             <a:endParaRPr sz="2400">
               <a:latin typeface="Open Sans"/>
@@ -10008,7 +10063,7 @@
             </a:endParaRPr>
           </a:p>
           <a:p>
-            <a:pPr indent="-381000" lvl="0" marL="457200" rtl="0" algn="l">
+            <a:pPr indent="0" lvl="0" marL="0" rtl="0" algn="l">
               <a:lnSpc>
                 <a:spcPct val="150000"/>
               </a:lnSpc>
@@ -10018,9 +10073,7 @@
               <a:spcAft>
                 <a:spcPts val="0"/>
               </a:spcAft>
-              <a:buSzPts val="2400"/>
-              <a:buFont typeface="Open Sans"/>
-              <a:buAutoNum type="arabicPeriod"/>
+              <a:buNone/>
             </a:pPr>
             <a:r>
               <a:rPr lang="en-GB" sz="2400">
@@ -10029,7 +10082,20 @@
                 <a:cs typeface="Open Sans"/>
                 <a:sym typeface="Open Sans"/>
               </a:rPr>
-              <a:t>Break / Your announcements (OpenSource, event etc.); Developer, engineer, lead lost &amp; found || Grab coffee/beer/food;</a:t>
+              <a:t>Twitter/X: </a:t>
+            </a:r>
+            <a:r>
+              <a:rPr lang="en-GB" sz="2400" u="sng">
+                <a:solidFill>
+                  <a:schemeClr val="hlink"/>
+                </a:solidFill>
+                <a:latin typeface="Open Sans"/>
+                <a:ea typeface="Open Sans"/>
+                <a:cs typeface="Open Sans"/>
+                <a:sym typeface="Open Sans"/>
+                <a:hlinkClick r:id="rId6"/>
+              </a:rPr>
+              <a:t>@golangwaw</a:t>
             </a:r>
             <a:endParaRPr sz="2400">
               <a:latin typeface="Open Sans"/>
@@ -10039,7 +10105,7 @@
             </a:endParaRPr>
           </a:p>
           <a:p>
-            <a:pPr indent="-381000" lvl="0" marL="457200" rtl="0" algn="l">
+            <a:pPr indent="0" lvl="0" marL="0" rtl="0" algn="l">
               <a:lnSpc>
                 <a:spcPct val="150000"/>
               </a:lnSpc>
@@ -10049,9 +10115,7 @@
               <a:spcAft>
                 <a:spcPts val="0"/>
               </a:spcAft>
-              <a:buSzPts val="2400"/>
-              <a:buFont typeface="Open Sans"/>
-              <a:buAutoNum type="arabicPeriod"/>
+              <a:buNone/>
             </a:pPr>
             <a:r>
               <a:rPr lang="en-GB" sz="2400">
@@ -10060,7 +10124,20 @@
                 <a:cs typeface="Open Sans"/>
                 <a:sym typeface="Open Sans"/>
               </a:rPr>
-              <a:t>Hedged requests in Go - Oleg Kovalov</a:t>
+              <a:t>Slides: </a:t>
+            </a:r>
+            <a:r>
+              <a:rPr lang="en-GB" sz="2400" u="sng">
+                <a:solidFill>
+                  <a:schemeClr val="hlink"/>
+                </a:solidFill>
+                <a:latin typeface="Open Sans"/>
+                <a:ea typeface="Open Sans"/>
+                <a:cs typeface="Open Sans"/>
+                <a:sym typeface="Open Sans"/>
+                <a:hlinkClick r:id="rId7"/>
+              </a:rPr>
+              <a:t>github.com/golangpoland/meetup_golang_warsaw</a:t>
             </a:r>
             <a:endParaRPr sz="2400">
               <a:latin typeface="Open Sans"/>
@@ -10070,7 +10147,7 @@
             </a:endParaRPr>
           </a:p>
           <a:p>
-            <a:pPr indent="-381000" lvl="0" marL="457200" rtl="0" algn="l">
+            <a:pPr indent="0" lvl="0" marL="0" rtl="0" algn="l">
               <a:lnSpc>
                 <a:spcPct val="150000"/>
               </a:lnSpc>
@@ -10080,9 +10157,7 @@
               <a:spcAft>
                 <a:spcPts val="0"/>
               </a:spcAft>
-              <a:buSzPts val="2400"/>
-              <a:buFont typeface="Open Sans"/>
-              <a:buAutoNum type="arabicPeriod"/>
+              <a:buNone/>
             </a:pPr>
             <a:r>
               <a:rPr lang="en-GB" sz="2400">
@@ -10091,7 +10166,89 @@
                 <a:cs typeface="Open Sans"/>
                 <a:sym typeface="Open Sans"/>
               </a:rPr>
-              <a:t>Afterparty, slowly moving to a place close by</a:t>
+              <a:t>Job Board: </a:t>
+            </a:r>
+            <a:r>
+              <a:rPr lang="en-GB" sz="2400" u="sng">
+                <a:solidFill>
+                  <a:schemeClr val="hlink"/>
+                </a:solidFill>
+                <a:latin typeface="Open Sans"/>
+                <a:ea typeface="Open Sans"/>
+                <a:cs typeface="Open Sans"/>
+                <a:sym typeface="Open Sans"/>
+                <a:hlinkClick r:id="rId8"/>
+              </a:rPr>
+              <a:t>facebook.com/groups/golangpolandjobs</a:t>
+            </a:r>
+            <a:endParaRPr sz="2400">
+              <a:latin typeface="Open Sans"/>
+              <a:ea typeface="Open Sans"/>
+              <a:cs typeface="Open Sans"/>
+              <a:sym typeface="Open Sans"/>
+            </a:endParaRPr>
+          </a:p>
+          <a:p>
+            <a:pPr indent="0" lvl="0" marL="0" rtl="0" algn="l">
+              <a:lnSpc>
+                <a:spcPct val="150000"/>
+              </a:lnSpc>
+              <a:spcBef>
+                <a:spcPts val="0"/>
+              </a:spcBef>
+              <a:spcAft>
+                <a:spcPts val="0"/>
+              </a:spcAft>
+              <a:buNone/>
+            </a:pPr>
+            <a:r>
+              <a:t/>
+            </a:r>
+            <a:endParaRPr sz="2400">
+              <a:latin typeface="Open Sans"/>
+              <a:ea typeface="Open Sans"/>
+              <a:cs typeface="Open Sans"/>
+              <a:sym typeface="Open Sans"/>
+            </a:endParaRPr>
+          </a:p>
+          <a:p>
+            <a:pPr indent="0" lvl="0" marL="0" rtl="0" algn="l">
+              <a:lnSpc>
+                <a:spcPct val="150000"/>
+              </a:lnSpc>
+              <a:spcBef>
+                <a:spcPts val="0"/>
+              </a:spcBef>
+              <a:spcAft>
+                <a:spcPts val="0"/>
+              </a:spcAft>
+              <a:buNone/>
+            </a:pPr>
+            <a:r>
+              <a:t/>
+            </a:r>
+            <a:endParaRPr sz="2400">
+              <a:latin typeface="Open Sans"/>
+              <a:ea typeface="Open Sans"/>
+              <a:cs typeface="Open Sans"/>
+              <a:sym typeface="Open Sans"/>
+            </a:endParaRPr>
+          </a:p>
+          <a:p>
+            <a:pPr indent="0" lvl="0" marL="0" rtl="0" algn="l">
+              <a:lnSpc>
+                <a:spcPct val="150000"/>
+              </a:lnSpc>
+              <a:spcBef>
+                <a:spcPts val="0"/>
+              </a:spcBef>
+              <a:spcAft>
+                <a:spcPts val="0"/>
+              </a:spcAft>
+              <a:buNone/>
+            </a:pPr>
+            <a:r>
+              <a:t/>
             </a:r>
             <a:endParaRPr sz="2400">
               <a:latin typeface="Open Sans"/>

</xml_diff>

<commit_message>
Update Golang Warsaw #53 deck (#10)
</commit_message>
<xml_diff>
--- a/2023/2023_53_Meetup_Warsaw/intro/golang-warsaw-53.pptx
+++ b/2023/2023_53_Meetup_Warsaw/intro/golang-warsaw-53.pptx
@@ -9977,7 +9977,7 @@
           </a:bodyPr>
           <a:lstStyle/>
           <a:p>
-            <a:pPr indent="-381000" lvl="0" marL="457200" rtl="0" algn="l">
+            <a:pPr indent="0" lvl="0" marL="0" rtl="0" algn="l">
               <a:lnSpc>
                 <a:spcPct val="150000"/>
               </a:lnSpc>
@@ -9987,9 +9987,7 @@
               <a:spcAft>
                 <a:spcPts val="0"/>
               </a:spcAft>
-              <a:buSzPts val="2400"/>
-              <a:buFont typeface="Open Sans"/>
-              <a:buAutoNum type="arabicPeriod"/>
+              <a:buNone/>
             </a:pPr>
             <a:r>
               <a:rPr lang="en-GB" sz="2400">
@@ -9998,7 +9996,64 @@
                 <a:cs typeface="Open Sans"/>
                 <a:sym typeface="Open Sans"/>
               </a:rPr>
-              <a:t>Transitioning to Go - Robert Pajak</a:t>
+              <a:t>Email: </a:t>
+            </a:r>
+            <a:r>
+              <a:rPr lang="en-GB" sz="2400" u="sng">
+                <a:solidFill>
+                  <a:schemeClr val="hlink"/>
+                </a:solidFill>
+                <a:latin typeface="Open Sans"/>
+                <a:ea typeface="Open Sans"/>
+                <a:cs typeface="Open Sans"/>
+                <a:sym typeface="Open Sans"/>
+                <a:hlinkClick r:id="rId3"/>
+              </a:rPr>
+              <a:t>lukasz@lukaszgut.com</a:t>
+            </a:r>
+            <a:r>
+              <a:rPr lang="en-GB" sz="2400">
+                <a:latin typeface="Open Sans"/>
+                <a:ea typeface="Open Sans"/>
+                <a:cs typeface="Open Sans"/>
+                <a:sym typeface="Open Sans"/>
+              </a:rPr>
+              <a:t>, </a:t>
+            </a:r>
+            <a:r>
+              <a:rPr lang="en-GB" sz="2400" u="sng">
+                <a:solidFill>
+                  <a:schemeClr val="hlink"/>
+                </a:solidFill>
+                <a:latin typeface="Open Sans"/>
+                <a:ea typeface="Open Sans"/>
+                <a:cs typeface="Open Sans"/>
+                <a:sym typeface="Open Sans"/>
+                <a:hlinkClick r:id="rId4"/>
+              </a:rPr>
+              <a:t>jakubdal@gmail.com</a:t>
+            </a:r>
+            <a:r>
+              <a:rPr lang="en-GB" sz="2400">
+                <a:latin typeface="Open Sans"/>
+                <a:ea typeface="Open Sans"/>
+                <a:cs typeface="Open Sans"/>
+                <a:sym typeface="Open Sans"/>
+              </a:rPr>
+              <a:t>, </a:t>
+            </a:r>
+            <a:r>
+              <a:rPr lang="en-GB" sz="2400" u="sng">
+                <a:solidFill>
+                  <a:schemeClr val="hlink"/>
+                </a:solidFill>
+                <a:latin typeface="Open Sans"/>
+                <a:ea typeface="Open Sans"/>
+                <a:cs typeface="Open Sans"/>
+                <a:sym typeface="Open Sans"/>
+                <a:hlinkClick r:id="rId5"/>
+              </a:rPr>
+              <a:t>wbarczynski@gmail.com</a:t>
             </a:r>
             <a:endParaRPr sz="2400">
               <a:latin typeface="Open Sans"/>
@@ -10008,7 +10063,7 @@
             </a:endParaRPr>
           </a:p>
           <a:p>
-            <a:pPr indent="-381000" lvl="0" marL="457200" rtl="0" algn="l">
+            <a:pPr indent="0" lvl="0" marL="0" rtl="0" algn="l">
               <a:lnSpc>
                 <a:spcPct val="150000"/>
               </a:lnSpc>
@@ -10018,9 +10073,7 @@
               <a:spcAft>
                 <a:spcPts val="0"/>
               </a:spcAft>
-              <a:buSzPts val="2400"/>
-              <a:buFont typeface="Open Sans"/>
-              <a:buAutoNum type="arabicPeriod"/>
+              <a:buNone/>
             </a:pPr>
             <a:r>
               <a:rPr lang="en-GB" sz="2400">
@@ -10029,7 +10082,20 @@
                 <a:cs typeface="Open Sans"/>
                 <a:sym typeface="Open Sans"/>
               </a:rPr>
-              <a:t>Break / Your announcements (OpenSource, event etc.); Developer, engineer, lead lost &amp; found || Grab coffee/beer/food;</a:t>
+              <a:t>Twitter/X: </a:t>
+            </a:r>
+            <a:r>
+              <a:rPr lang="en-GB" sz="2400" u="sng">
+                <a:solidFill>
+                  <a:schemeClr val="hlink"/>
+                </a:solidFill>
+                <a:latin typeface="Open Sans"/>
+                <a:ea typeface="Open Sans"/>
+                <a:cs typeface="Open Sans"/>
+                <a:sym typeface="Open Sans"/>
+                <a:hlinkClick r:id="rId6"/>
+              </a:rPr>
+              <a:t>@golangwaw</a:t>
             </a:r>
             <a:endParaRPr sz="2400">
               <a:latin typeface="Open Sans"/>
@@ -10039,7 +10105,7 @@
             </a:endParaRPr>
           </a:p>
           <a:p>
-            <a:pPr indent="-381000" lvl="0" marL="457200" rtl="0" algn="l">
+            <a:pPr indent="0" lvl="0" marL="0" rtl="0" algn="l">
               <a:lnSpc>
                 <a:spcPct val="150000"/>
               </a:lnSpc>
@@ -10049,9 +10115,7 @@
               <a:spcAft>
                 <a:spcPts val="0"/>
               </a:spcAft>
-              <a:buSzPts val="2400"/>
-              <a:buFont typeface="Open Sans"/>
-              <a:buAutoNum type="arabicPeriod"/>
+              <a:buNone/>
             </a:pPr>
             <a:r>
               <a:rPr lang="en-GB" sz="2400">
@@ -10060,7 +10124,20 @@
                 <a:cs typeface="Open Sans"/>
                 <a:sym typeface="Open Sans"/>
               </a:rPr>
-              <a:t>Hedged requests in Go - Oleg Kovalov</a:t>
+              <a:t>Slides: </a:t>
+            </a:r>
+            <a:r>
+              <a:rPr lang="en-GB" sz="2400" u="sng">
+                <a:solidFill>
+                  <a:schemeClr val="hlink"/>
+                </a:solidFill>
+                <a:latin typeface="Open Sans"/>
+                <a:ea typeface="Open Sans"/>
+                <a:cs typeface="Open Sans"/>
+                <a:sym typeface="Open Sans"/>
+                <a:hlinkClick r:id="rId7"/>
+              </a:rPr>
+              <a:t>github.com/golangpoland/meetup_golang_warsaw</a:t>
             </a:r>
             <a:endParaRPr sz="2400">
               <a:latin typeface="Open Sans"/>
@@ -10070,7 +10147,7 @@
             </a:endParaRPr>
           </a:p>
           <a:p>
-            <a:pPr indent="-381000" lvl="0" marL="457200" rtl="0" algn="l">
+            <a:pPr indent="0" lvl="0" marL="0" rtl="0" algn="l">
               <a:lnSpc>
                 <a:spcPct val="150000"/>
               </a:lnSpc>
@@ -10080,9 +10157,7 @@
               <a:spcAft>
                 <a:spcPts val="0"/>
               </a:spcAft>
-              <a:buSzPts val="2400"/>
-              <a:buFont typeface="Open Sans"/>
-              <a:buAutoNum type="arabicPeriod"/>
+              <a:buNone/>
             </a:pPr>
             <a:r>
               <a:rPr lang="en-GB" sz="2400">
@@ -10091,7 +10166,89 @@
                 <a:cs typeface="Open Sans"/>
                 <a:sym typeface="Open Sans"/>
               </a:rPr>
-              <a:t>Afterparty, slowly moving to a place close by</a:t>
+              <a:t>Job Board: </a:t>
+            </a:r>
+            <a:r>
+              <a:rPr lang="en-GB" sz="2400" u="sng">
+                <a:solidFill>
+                  <a:schemeClr val="hlink"/>
+                </a:solidFill>
+                <a:latin typeface="Open Sans"/>
+                <a:ea typeface="Open Sans"/>
+                <a:cs typeface="Open Sans"/>
+                <a:sym typeface="Open Sans"/>
+                <a:hlinkClick r:id="rId8"/>
+              </a:rPr>
+              <a:t>facebook.com/groups/golangpolandjobs</a:t>
+            </a:r>
+            <a:endParaRPr sz="2400">
+              <a:latin typeface="Open Sans"/>
+              <a:ea typeface="Open Sans"/>
+              <a:cs typeface="Open Sans"/>
+              <a:sym typeface="Open Sans"/>
+            </a:endParaRPr>
+          </a:p>
+          <a:p>
+            <a:pPr indent="0" lvl="0" marL="0" rtl="0" algn="l">
+              <a:lnSpc>
+                <a:spcPct val="150000"/>
+              </a:lnSpc>
+              <a:spcBef>
+                <a:spcPts val="0"/>
+              </a:spcBef>
+              <a:spcAft>
+                <a:spcPts val="0"/>
+              </a:spcAft>
+              <a:buNone/>
+            </a:pPr>
+            <a:r>
+              <a:t/>
+            </a:r>
+            <a:endParaRPr sz="2400">
+              <a:latin typeface="Open Sans"/>
+              <a:ea typeface="Open Sans"/>
+              <a:cs typeface="Open Sans"/>
+              <a:sym typeface="Open Sans"/>
+            </a:endParaRPr>
+          </a:p>
+          <a:p>
+            <a:pPr indent="0" lvl="0" marL="0" rtl="0" algn="l">
+              <a:lnSpc>
+                <a:spcPct val="150000"/>
+              </a:lnSpc>
+              <a:spcBef>
+                <a:spcPts val="0"/>
+              </a:spcBef>
+              <a:spcAft>
+                <a:spcPts val="0"/>
+              </a:spcAft>
+              <a:buNone/>
+            </a:pPr>
+            <a:r>
+              <a:t/>
+            </a:r>
+            <a:endParaRPr sz="2400">
+              <a:latin typeface="Open Sans"/>
+              <a:ea typeface="Open Sans"/>
+              <a:cs typeface="Open Sans"/>
+              <a:sym typeface="Open Sans"/>
+            </a:endParaRPr>
+          </a:p>
+          <a:p>
+            <a:pPr indent="0" lvl="0" marL="0" rtl="0" algn="l">
+              <a:lnSpc>
+                <a:spcPct val="150000"/>
+              </a:lnSpc>
+              <a:spcBef>
+                <a:spcPts val="0"/>
+              </a:spcBef>
+              <a:spcAft>
+                <a:spcPts val="0"/>
+              </a:spcAft>
+              <a:buNone/>
+            </a:pPr>
+            <a:r>
+              <a:t/>
             </a:r>
             <a:endParaRPr sz="2400">
               <a:latin typeface="Open Sans"/>

</xml_diff>